<commit_message>
One change to slides:
</commit_message>
<xml_diff>
--- a/class-notes/cs321-winter-2023-lecture-5-coding-tips.pptx
+++ b/class-notes/cs321-winter-2023-lecture-5-coding-tips.pptx
@@ -5,40 +5,41 @@
     <p:sldMasterId id="2147484010" r:id="rId1"/>
   </p:sldMasterIdLst>
   <p:notesMasterIdLst>
-    <p:notesMasterId r:id="rId16"/>
+    <p:notesMasterId r:id="rId17"/>
   </p:notesMasterIdLst>
   <p:sldIdLst>
     <p:sldId id="449" r:id="rId2"/>
-    <p:sldId id="472" r:id="rId3"/>
-    <p:sldId id="463" r:id="rId4"/>
-    <p:sldId id="460" r:id="rId5"/>
-    <p:sldId id="461" r:id="rId6"/>
-    <p:sldId id="462" r:id="rId7"/>
-    <p:sldId id="464" r:id="rId8"/>
-    <p:sldId id="465" r:id="rId9"/>
-    <p:sldId id="466" r:id="rId10"/>
-    <p:sldId id="467" r:id="rId11"/>
-    <p:sldId id="469" r:id="rId12"/>
-    <p:sldId id="470" r:id="rId13"/>
-    <p:sldId id="471" r:id="rId14"/>
-    <p:sldId id="468" r:id="rId15"/>
+    <p:sldId id="473" r:id="rId3"/>
+    <p:sldId id="472" r:id="rId4"/>
+    <p:sldId id="463" r:id="rId5"/>
+    <p:sldId id="460" r:id="rId6"/>
+    <p:sldId id="461" r:id="rId7"/>
+    <p:sldId id="462" r:id="rId8"/>
+    <p:sldId id="464" r:id="rId9"/>
+    <p:sldId id="465" r:id="rId10"/>
+    <p:sldId id="466" r:id="rId11"/>
+    <p:sldId id="467" r:id="rId12"/>
+    <p:sldId id="469" r:id="rId13"/>
+    <p:sldId id="470" r:id="rId14"/>
+    <p:sldId id="459" r:id="rId15"/>
+    <p:sldId id="468" r:id="rId16"/>
   </p:sldIdLst>
   <p:sldSz cx="18288000" cy="10287000"/>
   <p:notesSz cx="18288000" cy="10287000"/>
   <p:embeddedFontLst>
     <p:embeddedFont>
       <p:font typeface="Calibri" panose="020F0502020204030204" pitchFamily="34" charset="0"/>
-      <p:regular r:id="rId17"/>
-      <p:bold r:id="rId18"/>
-      <p:italic r:id="rId19"/>
-      <p:boldItalic r:id="rId20"/>
+      <p:regular r:id="rId18"/>
+      <p:bold r:id="rId19"/>
+      <p:italic r:id="rId20"/>
+      <p:boldItalic r:id="rId21"/>
     </p:embeddedFont>
     <p:embeddedFont>
       <p:font typeface="Corbel" panose="020B0503020204020204" pitchFamily="34" charset="0"/>
-      <p:regular r:id="rId21"/>
-      <p:bold r:id="rId22"/>
-      <p:italic r:id="rId23"/>
-      <p:boldItalic r:id="rId24"/>
+      <p:regular r:id="rId22"/>
+      <p:bold r:id="rId23"/>
+      <p:italic r:id="rId24"/>
+      <p:boldItalic r:id="rId25"/>
     </p:embeddedFont>
   </p:embeddedFontLst>
   <p:defaultTextStyle>
@@ -137,28 +138,6 @@
     </a:lvl9pPr>
   </p:defaultTextStyle>
   <p:extLst>
-    <p:ext uri="{521415D9-36F7-43E2-AB2F-B90AF26B5E84}">
-      <p14:sectionLst xmlns:p14="http://schemas.microsoft.com/office/powerpoint/2010/main">
-        <p14:section name="Collections" id="{4BAB7DA2-538C-42CB-B5A6-322AF23AA16F}">
-          <p14:sldIdLst>
-            <p14:sldId id="449"/>
-            <p14:sldId id="472"/>
-            <p14:sldId id="463"/>
-            <p14:sldId id="460"/>
-            <p14:sldId id="461"/>
-            <p14:sldId id="462"/>
-            <p14:sldId id="464"/>
-            <p14:sldId id="465"/>
-            <p14:sldId id="466"/>
-            <p14:sldId id="467"/>
-            <p14:sldId id="469"/>
-            <p14:sldId id="470"/>
-            <p14:sldId id="471"/>
-            <p14:sldId id="468"/>
-          </p14:sldIdLst>
-        </p14:section>
-      </p14:sectionLst>
-    </p:ext>
     <p:ext uri="{EFAFB233-063F-42B5-8137-9DF3F51BA10A}">
       <p15:sldGuideLst xmlns:p15="http://schemas.microsoft.com/office/powerpoint/2012/main">
         <p15:guide id="1" orient="horz" pos="2880">
@@ -4010,7 +3989,7 @@
           <p:cNvPr id="2" name="Title 1">
             <a:extLst>
               <a:ext uri="{FF2B5EF4-FFF2-40B4-BE49-F238E27FC236}">
-                <a16:creationId xmlns:a16="http://schemas.microsoft.com/office/drawing/2014/main" id="{EE739F40-FB03-9039-0004-B12BAB1E53FB}"/>
+                <a16:creationId xmlns:a16="http://schemas.microsoft.com/office/drawing/2014/main" id="{89ADA6D8-8BCA-1ACA-748A-10F571B22B21}"/>
               </a:ext>
             </a:extLst>
           </p:cNvPr>
@@ -4028,7 +4007,7 @@
           <a:p>
             <a:r>
               <a:rPr lang="en-CA" dirty="0"/>
-              <a:t>Use Variables</a:t>
+              <a:t>Use Braces</a:t>
             </a:r>
           </a:p>
         </p:txBody>
@@ -4038,7 +4017,7 @@
           <p:cNvPr id="3" name="Content Placeholder 2">
             <a:extLst>
               <a:ext uri="{FF2B5EF4-FFF2-40B4-BE49-F238E27FC236}">
-                <a16:creationId xmlns:a16="http://schemas.microsoft.com/office/drawing/2014/main" id="{51AEF6C0-DB09-9D66-C5E4-684E82CC3823}"/>
+                <a16:creationId xmlns:a16="http://schemas.microsoft.com/office/drawing/2014/main" id="{5E37D226-B9D0-7E53-A7C0-823472D1E0FE}"/>
               </a:ext>
             </a:extLst>
           </p:cNvPr>
@@ -4056,25 +4035,13 @@
           <a:p>
             <a:r>
               <a:rPr lang="en-CA" dirty="0"/>
-              <a:t>While learning, break complex expressions down into smaller ones</a:t>
-            </a:r>
-          </a:p>
-          <a:p>
-            <a:r>
-              <a:rPr lang="en-CA" dirty="0"/>
-              <a:t>Assign sub-expressions to variables</a:t>
-            </a:r>
-          </a:p>
-          <a:p>
-            <a:r>
-              <a:rPr lang="en-CA" dirty="0"/>
-              <a:t>Yes your code is longer, but easier to find mistakes </a:t>
-            </a:r>
-          </a:p>
-          <a:p>
-            <a:r>
-              <a:rPr lang="en-CA" dirty="0"/>
-              <a:t>You can also debug easier</a:t>
+              <a:t>If statements and loops don’t require curly braces</a:t>
+            </a:r>
+          </a:p>
+          <a:p>
+            <a:r>
+              <a:rPr lang="en-CA" dirty="0"/>
+              <a:t>However, it can make code easier to read and avoid errors </a:t>
             </a:r>
           </a:p>
         </p:txBody>
@@ -4082,7 +4049,7 @@
     </p:spTree>
     <p:extLst>
       <p:ext uri="{BB962C8B-B14F-4D97-AF65-F5344CB8AC3E}">
-        <p14:creationId xmlns:p14="http://schemas.microsoft.com/office/powerpoint/2010/main" val="2868703226"/>
+        <p14:creationId xmlns:p14="http://schemas.microsoft.com/office/powerpoint/2010/main" val="735660597"/>
       </p:ext>
     </p:extLst>
   </p:cSld>
@@ -4114,7 +4081,7 @@
           <p:cNvPr id="2" name="Title 1">
             <a:extLst>
               <a:ext uri="{FF2B5EF4-FFF2-40B4-BE49-F238E27FC236}">
-                <a16:creationId xmlns:a16="http://schemas.microsoft.com/office/drawing/2014/main" id="{87B53FD1-5D6D-AE45-DBF3-71334C6FE761}"/>
+                <a16:creationId xmlns:a16="http://schemas.microsoft.com/office/drawing/2014/main" id="{EE739F40-FB03-9039-0004-B12BAB1E53FB}"/>
               </a:ext>
             </a:extLst>
           </p:cNvPr>
@@ -4132,7 +4099,7 @@
           <a:p>
             <a:r>
               <a:rPr lang="en-CA" dirty="0"/>
-              <a:t>Comments</a:t>
+              <a:t>Use Variables</a:t>
             </a:r>
           </a:p>
         </p:txBody>
@@ -4142,7 +4109,7 @@
           <p:cNvPr id="3" name="Content Placeholder 2">
             <a:extLst>
               <a:ext uri="{FF2B5EF4-FFF2-40B4-BE49-F238E27FC236}">
-                <a16:creationId xmlns:a16="http://schemas.microsoft.com/office/drawing/2014/main" id="{B0DD44C8-D706-91DA-F8CD-51870432DC9B}"/>
+                <a16:creationId xmlns:a16="http://schemas.microsoft.com/office/drawing/2014/main" id="{51AEF6C0-DB09-9D66-C5E4-684E82CC3823}"/>
               </a:ext>
             </a:extLst>
           </p:cNvPr>
@@ -4160,31 +4127,25 @@
           <a:p>
             <a:r>
               <a:rPr lang="en-CA" dirty="0"/>
-              <a:t>Don’t put too many</a:t>
-            </a:r>
-          </a:p>
-          <a:p>
-            <a:r>
-              <a:rPr lang="en-CA" dirty="0"/>
-              <a:t>Don’t state the obvious </a:t>
-            </a:r>
-          </a:p>
-          <a:p>
-            <a:r>
-              <a:rPr lang="en-CA" dirty="0"/>
-              <a:t>They are for you and the reader</a:t>
-            </a:r>
-          </a:p>
-          <a:p>
-            <a:r>
-              <a:rPr lang="en-CA" dirty="0"/>
-              <a:t>Tell us something useful </a:t>
-            </a:r>
-          </a:p>
-          <a:p>
-            <a:r>
-              <a:rPr lang="en-CA" dirty="0"/>
-              <a:t>Code should speak for itself</a:t>
+              <a:t>While learning, break complex expressions down into smaller ones</a:t>
+            </a:r>
+          </a:p>
+          <a:p>
+            <a:r>
+              <a:rPr lang="en-CA" dirty="0"/>
+              <a:t>Assign sub-expressions to variables</a:t>
+            </a:r>
+          </a:p>
+          <a:p>
+            <a:r>
+              <a:rPr lang="en-CA" dirty="0"/>
+              <a:t>Yes your code is longer, but easier to find mistakes </a:t>
+            </a:r>
+          </a:p>
+          <a:p>
+            <a:r>
+              <a:rPr lang="en-CA" dirty="0"/>
+              <a:t>You can also debug easier</a:t>
             </a:r>
           </a:p>
         </p:txBody>
@@ -4192,7 +4153,7 @@
     </p:spTree>
     <p:extLst>
       <p:ext uri="{BB962C8B-B14F-4D97-AF65-F5344CB8AC3E}">
-        <p14:creationId xmlns:p14="http://schemas.microsoft.com/office/powerpoint/2010/main" val="3262184054"/>
+        <p14:creationId xmlns:p14="http://schemas.microsoft.com/office/powerpoint/2010/main" val="2868703226"/>
       </p:ext>
     </p:extLst>
   </p:cSld>
@@ -4224,7 +4185,7 @@
           <p:cNvPr id="2" name="Title 1">
             <a:extLst>
               <a:ext uri="{FF2B5EF4-FFF2-40B4-BE49-F238E27FC236}">
-                <a16:creationId xmlns:a16="http://schemas.microsoft.com/office/drawing/2014/main" id="{177CEBFA-D11D-E981-0C78-FD63E1053DD1}"/>
+                <a16:creationId xmlns:a16="http://schemas.microsoft.com/office/drawing/2014/main" id="{87B53FD1-5D6D-AE45-DBF3-71334C6FE761}"/>
               </a:ext>
             </a:extLst>
           </p:cNvPr>
@@ -4242,7 +4203,7 @@
           <a:p>
             <a:r>
               <a:rPr lang="en-CA" dirty="0"/>
-              <a:t>Don’t Leave Unused Code in a File</a:t>
+              <a:t>Comments</a:t>
             </a:r>
           </a:p>
         </p:txBody>
@@ -4252,7 +4213,7 @@
           <p:cNvPr id="3" name="Content Placeholder 2">
             <a:extLst>
               <a:ext uri="{FF2B5EF4-FFF2-40B4-BE49-F238E27FC236}">
-                <a16:creationId xmlns:a16="http://schemas.microsoft.com/office/drawing/2014/main" id="{70385A5F-FF19-C802-FDD7-1BE9E37C5634}"/>
+                <a16:creationId xmlns:a16="http://schemas.microsoft.com/office/drawing/2014/main" id="{B0DD44C8-D706-91DA-F8CD-51870432DC9B}"/>
               </a:ext>
             </a:extLst>
           </p:cNvPr>
@@ -4270,7 +4231,31 @@
           <a:p>
             <a:r>
               <a:rPr lang="en-CA" dirty="0"/>
-              <a:t>It can be confusing to yourself and others </a:t>
+              <a:t>Don’t put too many</a:t>
+            </a:r>
+          </a:p>
+          <a:p>
+            <a:r>
+              <a:rPr lang="en-CA" dirty="0"/>
+              <a:t>Don’t state the obvious </a:t>
+            </a:r>
+          </a:p>
+          <a:p>
+            <a:r>
+              <a:rPr lang="en-CA" dirty="0"/>
+              <a:t>They are for you and the reader</a:t>
+            </a:r>
+          </a:p>
+          <a:p>
+            <a:r>
+              <a:rPr lang="en-CA" dirty="0"/>
+              <a:t>Tell us something useful </a:t>
+            </a:r>
+          </a:p>
+          <a:p>
+            <a:r>
+              <a:rPr lang="en-CA" dirty="0"/>
+              <a:t>Code should speak for itself</a:t>
             </a:r>
           </a:p>
         </p:txBody>
@@ -4278,7 +4263,7 @@
     </p:spTree>
     <p:extLst>
       <p:ext uri="{BB962C8B-B14F-4D97-AF65-F5344CB8AC3E}">
-        <p14:creationId xmlns:p14="http://schemas.microsoft.com/office/powerpoint/2010/main" val="893508948"/>
+        <p14:creationId xmlns:p14="http://schemas.microsoft.com/office/powerpoint/2010/main" val="3262184054"/>
       </p:ext>
     </p:extLst>
   </p:cSld>
@@ -4310,7 +4295,7 @@
           <p:cNvPr id="2" name="Title 1">
             <a:extLst>
               <a:ext uri="{FF2B5EF4-FFF2-40B4-BE49-F238E27FC236}">
-                <a16:creationId xmlns:a16="http://schemas.microsoft.com/office/drawing/2014/main" id="{947459EA-4D54-C6E7-D34C-4421C264762E}"/>
+                <a16:creationId xmlns:a16="http://schemas.microsoft.com/office/drawing/2014/main" id="{177CEBFA-D11D-E981-0C78-FD63E1053DD1}"/>
               </a:ext>
             </a:extLst>
           </p:cNvPr>
@@ -4326,7 +4311,10 @@
           <a:bodyPr/>
           <a:lstStyle/>
           <a:p>
-            <a:endParaRPr lang="en-CA"/>
+            <a:r>
+              <a:rPr lang="en-CA" dirty="0"/>
+              <a:t>Don’t Leave Unused Code in a File</a:t>
+            </a:r>
           </a:p>
         </p:txBody>
       </p:sp>
@@ -4335,7 +4323,7 @@
           <p:cNvPr id="3" name="Content Placeholder 2">
             <a:extLst>
               <a:ext uri="{FF2B5EF4-FFF2-40B4-BE49-F238E27FC236}">
-                <a16:creationId xmlns:a16="http://schemas.microsoft.com/office/drawing/2014/main" id="{F70C7586-51D5-CB72-59A4-5F5C16FF9076}"/>
+                <a16:creationId xmlns:a16="http://schemas.microsoft.com/office/drawing/2014/main" id="{70385A5F-FF19-C802-FDD7-1BE9E37C5634}"/>
               </a:ext>
             </a:extLst>
           </p:cNvPr>
@@ -4351,14 +4339,17 @@
           <a:bodyPr/>
           <a:lstStyle/>
           <a:p>
-            <a:endParaRPr lang="en-CA"/>
+            <a:r>
+              <a:rPr lang="en-CA" dirty="0"/>
+              <a:t>It can be confusing to yourself and others </a:t>
+            </a:r>
           </a:p>
         </p:txBody>
       </p:sp>
     </p:spTree>
     <p:extLst>
       <p:ext uri="{BB962C8B-B14F-4D97-AF65-F5344CB8AC3E}">
-        <p14:creationId xmlns:p14="http://schemas.microsoft.com/office/powerpoint/2010/main" val="1313752760"/>
+        <p14:creationId xmlns:p14="http://schemas.microsoft.com/office/powerpoint/2010/main" val="893508948"/>
       </p:ext>
     </p:extLst>
   </p:cSld>
@@ -4390,6 +4381,92 @@
           <p:cNvPr id="2" name="Title 1">
             <a:extLst>
               <a:ext uri="{FF2B5EF4-FFF2-40B4-BE49-F238E27FC236}">
+                <a16:creationId xmlns:a16="http://schemas.microsoft.com/office/drawing/2014/main" id="{3563E7A6-B910-0243-9391-C8686F3839FA}"/>
+              </a:ext>
+            </a:extLst>
+          </p:cNvPr>
+          <p:cNvSpPr>
+            <a:spLocks noGrp="1"/>
+          </p:cNvSpPr>
+          <p:nvPr>
+            <p:ph type="title"/>
+          </p:nvPr>
+        </p:nvSpPr>
+        <p:spPr/>
+        <p:txBody>
+          <a:bodyPr/>
+          <a:lstStyle/>
+          <a:p>
+            <a:r>
+              <a:rPr lang="en-CA" dirty="0"/>
+              <a:t>For Note:</a:t>
+            </a:r>
+          </a:p>
+        </p:txBody>
+      </p:sp>
+      <p:sp>
+        <p:nvSpPr>
+          <p:cNvPr id="3" name="Content Placeholder 2">
+            <a:extLst>
+              <a:ext uri="{FF2B5EF4-FFF2-40B4-BE49-F238E27FC236}">
+                <a16:creationId xmlns:a16="http://schemas.microsoft.com/office/drawing/2014/main" id="{E86A9D30-4FB0-E93E-86B9-4BDC1813F907}"/>
+              </a:ext>
+            </a:extLst>
+          </p:cNvPr>
+          <p:cNvSpPr>
+            <a:spLocks noGrp="1"/>
+          </p:cNvSpPr>
+          <p:nvPr>
+            <p:ph idx="1"/>
+          </p:nvPr>
+        </p:nvSpPr>
+        <p:spPr/>
+        <p:txBody>
+          <a:bodyPr/>
+          <a:lstStyle/>
+          <a:p>
+            <a:r>
+              <a:rPr lang="en-CA" dirty="0"/>
+              <a:t>Don’t monkey with the loop index</a:t>
+            </a:r>
+          </a:p>
+        </p:txBody>
+      </p:sp>
+    </p:spTree>
+    <p:extLst>
+      <p:ext uri="{BB962C8B-B14F-4D97-AF65-F5344CB8AC3E}">
+        <p14:creationId xmlns:p14="http://schemas.microsoft.com/office/powerpoint/2010/main" val="413442007"/>
+      </p:ext>
+    </p:extLst>
+  </p:cSld>
+  <p:clrMapOvr>
+    <a:masterClrMapping/>
+  </p:clrMapOvr>
+</p:sld>
+</file>
+
+<file path=ppt/slides/slide15.xml><?xml version="1.0" encoding="utf-8"?>
+<p:sld xmlns:a="http://schemas.openxmlformats.org/drawingml/2006/main" xmlns:r="http://schemas.openxmlformats.org/officeDocument/2006/relationships" xmlns:p="http://schemas.openxmlformats.org/presentationml/2006/main">
+  <p:cSld>
+    <p:spTree>
+      <p:nvGrpSpPr>
+        <p:cNvPr id="1" name=""/>
+        <p:cNvGrpSpPr/>
+        <p:nvPr/>
+      </p:nvGrpSpPr>
+      <p:grpSpPr>
+        <a:xfrm>
+          <a:off x="0" y="0"/>
+          <a:ext cx="0" cy="0"/>
+          <a:chOff x="0" y="0"/>
+          <a:chExt cx="0" cy="0"/>
+        </a:xfrm>
+      </p:grpSpPr>
+      <p:sp>
+        <p:nvSpPr>
+          <p:cNvPr id="2" name="Title 1">
+            <a:extLst>
+              <a:ext uri="{FF2B5EF4-FFF2-40B4-BE49-F238E27FC236}">
                 <a16:creationId xmlns:a16="http://schemas.microsoft.com/office/drawing/2014/main" id="{1A1902A5-378A-1473-7A3C-C0E38249D025}"/>
               </a:ext>
             </a:extLst>
@@ -4472,6 +4549,14 @@
 <file path=ppt/slides/slide2.xml><?xml version="1.0" encoding="utf-8"?>
 <p:sld xmlns:a="http://schemas.openxmlformats.org/drawingml/2006/main" xmlns:r="http://schemas.openxmlformats.org/officeDocument/2006/relationships" xmlns:p="http://schemas.openxmlformats.org/presentationml/2006/main">
   <p:cSld>
+    <p:bg>
+      <p:bgPr>
+        <a:solidFill>
+          <a:schemeClr val="accent1"/>
+        </a:solidFill>
+        <a:effectLst/>
+      </p:bgPr>
+    </p:bg>
     <p:spTree>
       <p:nvGrpSpPr>
         <p:cNvPr id="1" name=""/>
@@ -4488,76 +4573,95 @@
       </p:grpSpPr>
       <p:sp>
         <p:nvSpPr>
-          <p:cNvPr id="2" name="Title 1">
+          <p:cNvPr id="12" name="Rectangle 11">
             <a:extLst>
               <a:ext uri="{FF2B5EF4-FFF2-40B4-BE49-F238E27FC236}">
-                <a16:creationId xmlns:a16="http://schemas.microsoft.com/office/drawing/2014/main" id="{F89639B5-1AC2-5DB2-B77C-A646B17EA6BA}"/>
+                <a16:creationId xmlns:a16="http://schemas.microsoft.com/office/drawing/2014/main" id="{D036D0D5-3AA0-47FD-A83C-7A06CA2EEE1A}"/>
+              </a:ext>
+              <a:ext uri="{C183D7F6-B498-43B3-948B-1728B52AA6E4}">
+                <adec:decorative xmlns:adec="http://schemas.microsoft.com/office/drawing/2017/decorative" val="1"/>
               </a:ext>
             </a:extLst>
           </p:cNvPr>
           <p:cNvSpPr>
-            <a:spLocks noGrp="1"/>
-          </p:cNvSpPr>
-          <p:nvPr>
-            <p:ph type="title"/>
-          </p:nvPr>
-        </p:nvSpPr>
-        <p:spPr/>
-        <p:txBody>
-          <a:bodyPr/>
-          <a:lstStyle/>
-          <a:p>
-            <a:r>
-              <a:rPr lang="en-CA" dirty="0"/>
-              <a:t>First Pieces of Advice</a:t>
-            </a:r>
-          </a:p>
-        </p:txBody>
-      </p:sp>
-      <p:sp>
-        <p:nvSpPr>
-          <p:cNvPr id="3" name="Content Placeholder 2">
+            <a:spLocks noGrp="1" noRot="1" noChangeAspect="1" noMove="1" noResize="1" noEditPoints="1" noAdjustHandles="1" noChangeArrowheads="1" noChangeShapeType="1" noTextEdit="1"/>
+          </p:cNvSpPr>
+          <p:nvPr>
+            <p:extLst>
+              <p:ext uri="{386F3935-93C4-4BCD-93E2-E3B085C9AB24}">
+                <p16:designElem xmlns:p16="http://schemas.microsoft.com/office/powerpoint/2015/main" val="1"/>
+              </p:ext>
+            </p:extLst>
+          </p:nvPr>
+        </p:nvSpPr>
+        <p:spPr>
+          <a:xfrm>
+            <a:off x="346710" y="365760"/>
+            <a:ext cx="17586960" cy="9566908"/>
+          </a:xfrm>
+          <a:prstGeom prst="rect">
+            <a:avLst/>
+          </a:prstGeom>
+          <a:solidFill>
+            <a:schemeClr val="bg1"/>
+          </a:solidFill>
+          <a:ln w="12700">
+            <a:noFill/>
+          </a:ln>
+        </p:spPr>
+        <p:style>
+          <a:lnRef idx="2">
+            <a:schemeClr val="accent1">
+              <a:shade val="50000"/>
+            </a:schemeClr>
+          </a:lnRef>
+          <a:fillRef idx="1">
+            <a:schemeClr val="accent1"/>
+          </a:fillRef>
+          <a:effectRef idx="0">
+            <a:schemeClr val="accent1"/>
+          </a:effectRef>
+          <a:fontRef idx="minor">
+            <a:schemeClr val="lt1"/>
+          </a:fontRef>
+        </p:style>
+      </p:sp>
+      <p:pic>
+        <p:nvPicPr>
+          <p:cNvPr id="7" name="Content Placeholder 6">
             <a:extLst>
               <a:ext uri="{FF2B5EF4-FFF2-40B4-BE49-F238E27FC236}">
-                <a16:creationId xmlns:a16="http://schemas.microsoft.com/office/drawing/2014/main" id="{38CC42F3-479A-822B-047C-DEB1F9B1C1C0}"/>
+                <a16:creationId xmlns:a16="http://schemas.microsoft.com/office/drawing/2014/main" id="{5FABE53F-D1BB-B532-9131-0B2EF8B3B826}"/>
               </a:ext>
             </a:extLst>
           </p:cNvPr>
-          <p:cNvSpPr>
-            <a:spLocks noGrp="1"/>
-          </p:cNvSpPr>
+          <p:cNvPicPr>
+            <a:picLocks noGrp="1" noChangeAspect="1"/>
+          </p:cNvPicPr>
           <p:nvPr>
             <p:ph idx="1"/>
           </p:nvPr>
-        </p:nvSpPr>
-        <p:spPr/>
-        <p:txBody>
-          <a:bodyPr/>
-          <a:lstStyle/>
-          <a:p>
-            <a:r>
-              <a:rPr lang="en-CA" dirty="0"/>
-              <a:t>Practice, practice, practice </a:t>
-            </a:r>
-          </a:p>
-          <a:p>
-            <a:r>
-              <a:rPr lang="en-CA" dirty="0"/>
-              <a:t>You will get much faster</a:t>
-            </a:r>
-          </a:p>
-          <a:p>
-            <a:r>
-              <a:rPr lang="en-CA" dirty="0"/>
-              <a:t>If you are stuck, ask for help </a:t>
-            </a:r>
-          </a:p>
-        </p:txBody>
-      </p:sp>
+        </p:nvPicPr>
+        <p:blipFill>
+          <a:blip r:embed="rId2"/>
+          <a:stretch>
+            <a:fillRect/>
+          </a:stretch>
+        </p:blipFill>
+        <p:spPr>
+          <a:xfrm>
+            <a:off x="1692822" y="848359"/>
+            <a:ext cx="14894733" cy="8601711"/>
+          </a:xfrm>
+          <a:prstGeom prst="rect">
+            <a:avLst/>
+          </a:prstGeom>
+        </p:spPr>
+      </p:pic>
     </p:spTree>
     <p:extLst>
       <p:ext uri="{BB962C8B-B14F-4D97-AF65-F5344CB8AC3E}">
-        <p14:creationId xmlns:p14="http://schemas.microsoft.com/office/powerpoint/2010/main" val="1480383612"/>
+        <p14:creationId xmlns:p14="http://schemas.microsoft.com/office/powerpoint/2010/main" val="2331828988"/>
       </p:ext>
     </p:extLst>
   </p:cSld>
@@ -4589,7 +4693,7 @@
           <p:cNvPr id="2" name="Title 1">
             <a:extLst>
               <a:ext uri="{FF2B5EF4-FFF2-40B4-BE49-F238E27FC236}">
-                <a16:creationId xmlns:a16="http://schemas.microsoft.com/office/drawing/2014/main" id="{31899640-0EDB-1417-87A2-4F99003942B4}"/>
+                <a16:creationId xmlns:a16="http://schemas.microsoft.com/office/drawing/2014/main" id="{F89639B5-1AC2-5DB2-B77C-A646B17EA6BA}"/>
               </a:ext>
             </a:extLst>
           </p:cNvPr>
@@ -4607,7 +4711,7 @@
           <a:p>
             <a:r>
               <a:rPr lang="en-CA" dirty="0"/>
-              <a:t>Learning to Program</a:t>
+              <a:t>First Pieces of Advice</a:t>
             </a:r>
           </a:p>
         </p:txBody>
@@ -4617,7 +4721,7 @@
           <p:cNvPr id="3" name="Content Placeholder 2">
             <a:extLst>
               <a:ext uri="{FF2B5EF4-FFF2-40B4-BE49-F238E27FC236}">
-                <a16:creationId xmlns:a16="http://schemas.microsoft.com/office/drawing/2014/main" id="{A17B8D6F-40E2-8ECB-0547-76563F0A50ED}"/>
+                <a16:creationId xmlns:a16="http://schemas.microsoft.com/office/drawing/2014/main" id="{38CC42F3-479A-822B-047C-DEB1F9B1C1C0}"/>
               </a:ext>
             </a:extLst>
           </p:cNvPr>
@@ -4635,36 +4739,27 @@
           <a:p>
             <a:r>
               <a:rPr lang="en-CA" dirty="0"/>
-              <a:t>Recognizing mistakes</a:t>
-            </a:r>
-          </a:p>
-          <a:p>
-            <a:r>
-              <a:rPr lang="en-CA" dirty="0"/>
-              <a:t>Reading code</a:t>
-            </a:r>
-          </a:p>
-          <a:p>
-            <a:r>
-              <a:rPr lang="en-CA" dirty="0"/>
-              <a:t>Problem solving </a:t>
-            </a:r>
-          </a:p>
-          <a:p>
-            <a:r>
-              <a:rPr lang="en-CA" dirty="0"/>
-              <a:t>Writing code </a:t>
-            </a:r>
-          </a:p>
-          <a:p>
-            <a:endParaRPr lang="en-CA" dirty="0"/>
+              <a:t>Practice, practice, practice </a:t>
+            </a:r>
+          </a:p>
+          <a:p>
+            <a:r>
+              <a:rPr lang="en-CA" dirty="0"/>
+              <a:t>You will get much faster</a:t>
+            </a:r>
+          </a:p>
+          <a:p>
+            <a:r>
+              <a:rPr lang="en-CA" dirty="0"/>
+              <a:t>If you are stuck, ask for help </a:t>
+            </a:r>
           </a:p>
         </p:txBody>
       </p:sp>
     </p:spTree>
     <p:extLst>
       <p:ext uri="{BB962C8B-B14F-4D97-AF65-F5344CB8AC3E}">
-        <p14:creationId xmlns:p14="http://schemas.microsoft.com/office/powerpoint/2010/main" val="2523865817"/>
+        <p14:creationId xmlns:p14="http://schemas.microsoft.com/office/powerpoint/2010/main" val="1480383612"/>
       </p:ext>
     </p:extLst>
   </p:cSld>
@@ -4696,7 +4791,7 @@
           <p:cNvPr id="2" name="Title 1">
             <a:extLst>
               <a:ext uri="{FF2B5EF4-FFF2-40B4-BE49-F238E27FC236}">
-                <a16:creationId xmlns:a16="http://schemas.microsoft.com/office/drawing/2014/main" id="{FAAF173A-3599-D588-E539-9FA63820A3F6}"/>
+                <a16:creationId xmlns:a16="http://schemas.microsoft.com/office/drawing/2014/main" id="{31899640-0EDB-1417-87A2-4F99003942B4}"/>
               </a:ext>
             </a:extLst>
           </p:cNvPr>
@@ -4714,7 +4809,7 @@
           <a:p>
             <a:r>
               <a:rPr lang="en-CA" dirty="0"/>
-              <a:t>Programming Note</a:t>
+              <a:t>Learning to Program</a:t>
             </a:r>
           </a:p>
         </p:txBody>
@@ -4724,7 +4819,7 @@
           <p:cNvPr id="3" name="Content Placeholder 2">
             <a:extLst>
               <a:ext uri="{FF2B5EF4-FFF2-40B4-BE49-F238E27FC236}">
-                <a16:creationId xmlns:a16="http://schemas.microsoft.com/office/drawing/2014/main" id="{C46AD402-CFDA-96C4-B15A-9A0B03385CA3}"/>
+                <a16:creationId xmlns:a16="http://schemas.microsoft.com/office/drawing/2014/main" id="{A17B8D6F-40E2-8ECB-0547-76563F0A50ED}"/>
               </a:ext>
             </a:extLst>
           </p:cNvPr>
@@ -4742,39 +4837,36 @@
           <a:p>
             <a:r>
               <a:rPr lang="en-CA" dirty="0"/>
-              <a:t>If you are confused </a:t>
-            </a:r>
-          </a:p>
-          <a:p>
-            <a:r>
-              <a:rPr lang="en-CA" dirty="0"/>
-              <a:t>Set a breakpoint see what it does</a:t>
-            </a:r>
-          </a:p>
-          <a:p>
-            <a:r>
-              <a:rPr lang="en-CA" dirty="0"/>
-              <a:t>Step through the code</a:t>
-            </a:r>
-          </a:p>
-          <a:p>
-            <a:r>
-              <a:rPr lang="en-CA" dirty="0"/>
-              <a:t>Ask yourself, is it doing what I expected? </a:t>
-            </a:r>
-          </a:p>
-          <a:p>
-            <a:r>
-              <a:rPr lang="en-CA" dirty="0"/>
-              <a:t>Why or why not? </a:t>
-            </a:r>
+              <a:t>Recognizing mistakes</a:t>
+            </a:r>
+          </a:p>
+          <a:p>
+            <a:r>
+              <a:rPr lang="en-CA" dirty="0"/>
+              <a:t>Reading code</a:t>
+            </a:r>
+          </a:p>
+          <a:p>
+            <a:r>
+              <a:rPr lang="en-CA" dirty="0"/>
+              <a:t>Problem solving </a:t>
+            </a:r>
+          </a:p>
+          <a:p>
+            <a:r>
+              <a:rPr lang="en-CA" dirty="0"/>
+              <a:t>Writing code </a:t>
+            </a:r>
+          </a:p>
+          <a:p>
+            <a:endParaRPr lang="en-CA" dirty="0"/>
           </a:p>
         </p:txBody>
       </p:sp>
     </p:spTree>
     <p:extLst>
       <p:ext uri="{BB962C8B-B14F-4D97-AF65-F5344CB8AC3E}">
-        <p14:creationId xmlns:p14="http://schemas.microsoft.com/office/powerpoint/2010/main" val="1606527081"/>
+        <p14:creationId xmlns:p14="http://schemas.microsoft.com/office/powerpoint/2010/main" val="2523865817"/>
       </p:ext>
     </p:extLst>
   </p:cSld>
@@ -4806,7 +4898,7 @@
           <p:cNvPr id="2" name="Title 1">
             <a:extLst>
               <a:ext uri="{FF2B5EF4-FFF2-40B4-BE49-F238E27FC236}">
-                <a16:creationId xmlns:a16="http://schemas.microsoft.com/office/drawing/2014/main" id="{FD624D57-66E1-49E4-E03A-D348E04B1B45}"/>
+                <a16:creationId xmlns:a16="http://schemas.microsoft.com/office/drawing/2014/main" id="{FAAF173A-3599-D588-E539-9FA63820A3F6}"/>
               </a:ext>
             </a:extLst>
           </p:cNvPr>
@@ -4824,7 +4916,7 @@
           <a:p>
             <a:r>
               <a:rPr lang="en-CA" dirty="0"/>
-              <a:t>If you are not sure what you expect </a:t>
+              <a:t>Programming Note</a:t>
             </a:r>
           </a:p>
         </p:txBody>
@@ -4834,7 +4926,7 @@
           <p:cNvPr id="3" name="Content Placeholder 2">
             <a:extLst>
               <a:ext uri="{FF2B5EF4-FFF2-40B4-BE49-F238E27FC236}">
-                <a16:creationId xmlns:a16="http://schemas.microsoft.com/office/drawing/2014/main" id="{60008D4E-D752-0E2F-7225-C9851C50E52B}"/>
+                <a16:creationId xmlns:a16="http://schemas.microsoft.com/office/drawing/2014/main" id="{C46AD402-CFDA-96C4-B15A-9A0B03385CA3}"/>
               </a:ext>
             </a:extLst>
           </p:cNvPr>
@@ -4852,51 +4944,39 @@
           <a:p>
             <a:r>
               <a:rPr lang="en-CA" dirty="0"/>
-              <a:t>Valid!! </a:t>
-            </a:r>
-          </a:p>
-          <a:p>
-            <a:r>
-              <a:rPr lang="en-CA" dirty="0"/>
-              <a:t>Write out what you want to happen in code</a:t>
-            </a:r>
-          </a:p>
-          <a:p>
-            <a:r>
-              <a:rPr lang="en-CA" dirty="0"/>
-              <a:t>Find the inconsistency in your code and understanding  </a:t>
-            </a:r>
-          </a:p>
-          <a:p>
-            <a:r>
-              <a:rPr lang="en-CA" dirty="0"/>
-              <a:t>Ask yourself in a comment</a:t>
-            </a:r>
-          </a:p>
-          <a:p>
-            <a:r>
-              <a:rPr lang="en-CA" dirty="0"/>
-              <a:t>Make the best guess</a:t>
-            </a:r>
-          </a:p>
-          <a:p>
-            <a:r>
-              <a:rPr lang="en-CA" dirty="0"/>
-              <a:t>Mention you are guessing </a:t>
-            </a:r>
-          </a:p>
-          <a:p>
-            <a:pPr marL="68580" indent="0">
-              <a:buNone/>
-            </a:pPr>
-            <a:endParaRPr lang="en-CA" dirty="0"/>
+              <a:t>If you are confused </a:t>
+            </a:r>
+          </a:p>
+          <a:p>
+            <a:r>
+              <a:rPr lang="en-CA" dirty="0"/>
+              <a:t>Set a breakpoint see what it does</a:t>
+            </a:r>
+          </a:p>
+          <a:p>
+            <a:r>
+              <a:rPr lang="en-CA" dirty="0"/>
+              <a:t>Step through the code</a:t>
+            </a:r>
+          </a:p>
+          <a:p>
+            <a:r>
+              <a:rPr lang="en-CA" dirty="0"/>
+              <a:t>Ask yourself, is it doing what I expected? </a:t>
+            </a:r>
+          </a:p>
+          <a:p>
+            <a:r>
+              <a:rPr lang="en-CA" dirty="0"/>
+              <a:t>Why or why not? </a:t>
+            </a:r>
           </a:p>
         </p:txBody>
       </p:sp>
     </p:spTree>
     <p:extLst>
       <p:ext uri="{BB962C8B-B14F-4D97-AF65-F5344CB8AC3E}">
-        <p14:creationId xmlns:p14="http://schemas.microsoft.com/office/powerpoint/2010/main" val="4026044480"/>
+        <p14:creationId xmlns:p14="http://schemas.microsoft.com/office/powerpoint/2010/main" val="1606527081"/>
       </p:ext>
     </p:extLst>
   </p:cSld>
@@ -4928,7 +5008,7 @@
           <p:cNvPr id="2" name="Title 1">
             <a:extLst>
               <a:ext uri="{FF2B5EF4-FFF2-40B4-BE49-F238E27FC236}">
-                <a16:creationId xmlns:a16="http://schemas.microsoft.com/office/drawing/2014/main" id="{2342F321-285A-17A0-A57D-7FC6496F2393}"/>
+                <a16:creationId xmlns:a16="http://schemas.microsoft.com/office/drawing/2014/main" id="{FD624D57-66E1-49E4-E03A-D348E04B1B45}"/>
               </a:ext>
             </a:extLst>
           </p:cNvPr>
@@ -4946,7 +5026,7 @@
           <a:p>
             <a:r>
               <a:rPr lang="en-CA" dirty="0"/>
-              <a:t>Tracing and Asserts</a:t>
+              <a:t>If you are not sure what you expect </a:t>
             </a:r>
           </a:p>
         </p:txBody>
@@ -4956,7 +5036,7 @@
           <p:cNvPr id="3" name="Content Placeholder 2">
             <a:extLst>
               <a:ext uri="{FF2B5EF4-FFF2-40B4-BE49-F238E27FC236}">
-                <a16:creationId xmlns:a16="http://schemas.microsoft.com/office/drawing/2014/main" id="{FFAA526C-A9D1-1594-7D07-04E916DFFBCB}"/>
+                <a16:creationId xmlns:a16="http://schemas.microsoft.com/office/drawing/2014/main" id="{60008D4E-D752-0E2F-7225-C9851C50E52B}"/>
               </a:ext>
             </a:extLst>
           </p:cNvPr>
@@ -4974,73 +5054,51 @@
           <a:p>
             <a:r>
               <a:rPr lang="en-CA" dirty="0"/>
-              <a:t>Use </a:t>
-            </a:r>
-            <a:r>
-              <a:rPr lang="en-CA" dirty="0" err="1"/>
-              <a:t>Debug.WriteLine</a:t>
-            </a:r>
-            <a:r>
-              <a:rPr lang="en-CA" dirty="0"/>
-              <a:t>() in regular code </a:t>
-            </a:r>
-          </a:p>
-          <a:p>
-            <a:r>
-              <a:rPr lang="en-CA" dirty="0"/>
-              <a:t>Use </a:t>
-            </a:r>
-            <a:r>
-              <a:rPr lang="en-CA" dirty="0" err="1"/>
-              <a:t>Console.WriteLine</a:t>
-            </a:r>
-            <a:r>
-              <a:rPr lang="en-CA" dirty="0"/>
-              <a:t>() in tests </a:t>
-            </a:r>
-          </a:p>
-          <a:p>
-            <a:r>
-              <a:rPr lang="en-CA" dirty="0"/>
-              <a:t>Use </a:t>
-            </a:r>
-            <a:r>
-              <a:rPr lang="en-CA" dirty="0" err="1"/>
-              <a:t>Debug.Assert</a:t>
-            </a:r>
-            <a:r>
-              <a:rPr lang="en-CA" dirty="0"/>
-              <a:t>() in regular code</a:t>
-            </a:r>
-          </a:p>
-          <a:p>
-            <a:r>
-              <a:rPr lang="en-CA" dirty="0"/>
-              <a:t>Use </a:t>
-            </a:r>
-            <a:r>
-              <a:rPr lang="en-CA" dirty="0" err="1"/>
-              <a:t>Assert.IsTrue</a:t>
-            </a:r>
-            <a:r>
-              <a:rPr lang="en-CA" dirty="0"/>
-              <a:t> or </a:t>
-            </a:r>
-            <a:r>
-              <a:rPr lang="en-CA" dirty="0" err="1"/>
-              <a:t>Assert.AreEqual</a:t>
-            </a:r>
-            <a:r>
-              <a:rPr lang="en-CA" dirty="0"/>
-              <a:t> in tests projects </a:t>
-            </a:r>
+              <a:t>Valid!! </a:t>
+            </a:r>
+          </a:p>
+          <a:p>
+            <a:r>
+              <a:rPr lang="en-CA" dirty="0"/>
+              <a:t>Write out what you want to happen in code</a:t>
+            </a:r>
+          </a:p>
+          <a:p>
+            <a:r>
+              <a:rPr lang="en-CA" dirty="0"/>
+              <a:t>Find the inconsistency in your code and understanding  </a:t>
+            </a:r>
+          </a:p>
+          <a:p>
+            <a:r>
+              <a:rPr lang="en-CA" dirty="0"/>
+              <a:t>Ask yourself in a comment</a:t>
+            </a:r>
+          </a:p>
+          <a:p>
+            <a:r>
+              <a:rPr lang="en-CA" dirty="0"/>
+              <a:t>Make the best guess</a:t>
+            </a:r>
+          </a:p>
+          <a:p>
+            <a:r>
+              <a:rPr lang="en-CA" dirty="0"/>
+              <a:t>Mention you are guessing </a:t>
+            </a:r>
+          </a:p>
+          <a:p>
+            <a:pPr marL="68580" indent="0">
+              <a:buNone/>
+            </a:pPr>
+            <a:endParaRPr lang="en-CA" dirty="0"/>
           </a:p>
         </p:txBody>
       </p:sp>
     </p:spTree>
     <p:extLst>
       <p:ext uri="{BB962C8B-B14F-4D97-AF65-F5344CB8AC3E}">
-        <p14:creationId xmlns:p14="http://schemas.microsoft.com/office/powerpoint/2010/main" val="3450891460"/>
+        <p14:creationId xmlns:p14="http://schemas.microsoft.com/office/powerpoint/2010/main" val="4026044480"/>
       </p:ext>
     </p:extLst>
   </p:cSld>
@@ -5072,7 +5130,7 @@
           <p:cNvPr id="2" name="Title 1">
             <a:extLst>
               <a:ext uri="{FF2B5EF4-FFF2-40B4-BE49-F238E27FC236}">
-                <a16:creationId xmlns:a16="http://schemas.microsoft.com/office/drawing/2014/main" id="{76632208-F2C5-9BE8-54BC-95ACE08284E0}"/>
+                <a16:creationId xmlns:a16="http://schemas.microsoft.com/office/drawing/2014/main" id="{2342F321-285A-17A0-A57D-7FC6496F2393}"/>
               </a:ext>
             </a:extLst>
           </p:cNvPr>
@@ -5090,7 +5148,7 @@
           <a:p>
             <a:r>
               <a:rPr lang="en-CA" dirty="0"/>
-              <a:t>Reversing the Direction</a:t>
+              <a:t>Tracing and Asserts</a:t>
             </a:r>
           </a:p>
         </p:txBody>
@@ -5100,7 +5158,7 @@
           <p:cNvPr id="3" name="Content Placeholder 2">
             <a:extLst>
               <a:ext uri="{FF2B5EF4-FFF2-40B4-BE49-F238E27FC236}">
-                <a16:creationId xmlns:a16="http://schemas.microsoft.com/office/drawing/2014/main" id="{3B90CF3A-B4E8-3829-6AAF-DDA6B89EEE82}"/>
+                <a16:creationId xmlns:a16="http://schemas.microsoft.com/office/drawing/2014/main" id="{FFAA526C-A9D1-1594-7D07-04E916DFFBCB}"/>
               </a:ext>
             </a:extLst>
           </p:cNvPr>
@@ -5118,13 +5176,65 @@
           <a:p>
             <a:r>
               <a:rPr lang="en-CA" dirty="0"/>
-              <a:t>A problem solving trick is to reverse the direction that we loop over stuff</a:t>
-            </a:r>
-          </a:p>
-          <a:p>
-            <a:r>
-              <a:rPr lang="en-CA" dirty="0"/>
-              <a:t>Look for a “counter example” as opposed to proving something is true</a:t>
+              <a:t>Use </a:t>
+            </a:r>
+            <a:r>
+              <a:rPr lang="en-CA" dirty="0" err="1"/>
+              <a:t>Debug.WriteLine</a:t>
+            </a:r>
+            <a:r>
+              <a:rPr lang="en-CA" dirty="0"/>
+              <a:t>() in regular code </a:t>
+            </a:r>
+          </a:p>
+          <a:p>
+            <a:r>
+              <a:rPr lang="en-CA" dirty="0"/>
+              <a:t>Use </a:t>
+            </a:r>
+            <a:r>
+              <a:rPr lang="en-CA" dirty="0" err="1"/>
+              <a:t>Console.WriteLine</a:t>
+            </a:r>
+            <a:r>
+              <a:rPr lang="en-CA" dirty="0"/>
+              <a:t>() in tests </a:t>
+            </a:r>
+          </a:p>
+          <a:p>
+            <a:r>
+              <a:rPr lang="en-CA" dirty="0"/>
+              <a:t>Use </a:t>
+            </a:r>
+            <a:r>
+              <a:rPr lang="en-CA" dirty="0" err="1"/>
+              <a:t>Debug.Assert</a:t>
+            </a:r>
+            <a:r>
+              <a:rPr lang="en-CA" dirty="0"/>
+              <a:t>() in regular code</a:t>
+            </a:r>
+          </a:p>
+          <a:p>
+            <a:r>
+              <a:rPr lang="en-CA" dirty="0"/>
+              <a:t>Use </a:t>
+            </a:r>
+            <a:r>
+              <a:rPr lang="en-CA" dirty="0" err="1"/>
+              <a:t>Assert.IsTrue</a:t>
+            </a:r>
+            <a:r>
+              <a:rPr lang="en-CA" dirty="0"/>
+              <a:t> or </a:t>
+            </a:r>
+            <a:r>
+              <a:rPr lang="en-CA" dirty="0" err="1"/>
+              <a:t>Assert.AreEqual</a:t>
+            </a:r>
+            <a:r>
+              <a:rPr lang="en-CA" dirty="0"/>
+              <a:t> in tests projects </a:t>
             </a:r>
           </a:p>
         </p:txBody>
@@ -5132,7 +5242,7 @@
     </p:spTree>
     <p:extLst>
       <p:ext uri="{BB962C8B-B14F-4D97-AF65-F5344CB8AC3E}">
-        <p14:creationId xmlns:p14="http://schemas.microsoft.com/office/powerpoint/2010/main" val="2390032652"/>
+        <p14:creationId xmlns:p14="http://schemas.microsoft.com/office/powerpoint/2010/main" val="3450891460"/>
       </p:ext>
     </p:extLst>
   </p:cSld>
@@ -5164,7 +5274,7 @@
           <p:cNvPr id="2" name="Title 1">
             <a:extLst>
               <a:ext uri="{FF2B5EF4-FFF2-40B4-BE49-F238E27FC236}">
-                <a16:creationId xmlns:a16="http://schemas.microsoft.com/office/drawing/2014/main" id="{7B7C3C28-3B09-3788-3C99-192453862B47}"/>
+                <a16:creationId xmlns:a16="http://schemas.microsoft.com/office/drawing/2014/main" id="{76632208-F2C5-9BE8-54BC-95ACE08284E0}"/>
               </a:ext>
             </a:extLst>
           </p:cNvPr>
@@ -5182,7 +5292,7 @@
           <a:p>
             <a:r>
               <a:rPr lang="en-CA" dirty="0"/>
-              <a:t>Consider the Test Cases</a:t>
+              <a:t>Reversing the Direction</a:t>
             </a:r>
           </a:p>
         </p:txBody>
@@ -5192,7 +5302,7 @@
           <p:cNvPr id="3" name="Content Placeholder 2">
             <a:extLst>
               <a:ext uri="{FF2B5EF4-FFF2-40B4-BE49-F238E27FC236}">
-                <a16:creationId xmlns:a16="http://schemas.microsoft.com/office/drawing/2014/main" id="{F4D3E700-1C44-A6C6-C6AF-0037DCD75C68}"/>
+                <a16:creationId xmlns:a16="http://schemas.microsoft.com/office/drawing/2014/main" id="{3B90CF3A-B4E8-3829-6AAF-DDA6B89EEE82}"/>
               </a:ext>
             </a:extLst>
           </p:cNvPr>
@@ -5210,25 +5320,13 @@
           <a:p>
             <a:r>
               <a:rPr lang="en-CA" dirty="0"/>
-              <a:t>Make them explicit</a:t>
-            </a:r>
-          </a:p>
-          <a:p>
-            <a:r>
-              <a:rPr lang="en-CA" dirty="0"/>
-              <a:t>Don’t solve every problem right away</a:t>
-            </a:r>
-          </a:p>
-          <a:p>
-            <a:r>
-              <a:rPr lang="en-CA" dirty="0"/>
-              <a:t>Sometimes code is “good enough”</a:t>
-            </a:r>
-          </a:p>
-          <a:p>
-            <a:r>
-              <a:rPr lang="en-CA" dirty="0"/>
-              <a:t>That is where documentation is important </a:t>
+              <a:t>A problem solving trick is to reverse the direction that we loop over stuff</a:t>
+            </a:r>
+          </a:p>
+          <a:p>
+            <a:r>
+              <a:rPr lang="en-CA" dirty="0"/>
+              <a:t>Look for a “counter example” as opposed to proving something is true</a:t>
             </a:r>
           </a:p>
         </p:txBody>
@@ -5236,7 +5334,7 @@
     </p:spTree>
     <p:extLst>
       <p:ext uri="{BB962C8B-B14F-4D97-AF65-F5344CB8AC3E}">
-        <p14:creationId xmlns:p14="http://schemas.microsoft.com/office/powerpoint/2010/main" val="3069868560"/>
+        <p14:creationId xmlns:p14="http://schemas.microsoft.com/office/powerpoint/2010/main" val="2390032652"/>
       </p:ext>
     </p:extLst>
   </p:cSld>
@@ -5268,7 +5366,7 @@
           <p:cNvPr id="2" name="Title 1">
             <a:extLst>
               <a:ext uri="{FF2B5EF4-FFF2-40B4-BE49-F238E27FC236}">
-                <a16:creationId xmlns:a16="http://schemas.microsoft.com/office/drawing/2014/main" id="{89ADA6D8-8BCA-1ACA-748A-10F571B22B21}"/>
+                <a16:creationId xmlns:a16="http://schemas.microsoft.com/office/drawing/2014/main" id="{7B7C3C28-3B09-3788-3C99-192453862B47}"/>
               </a:ext>
             </a:extLst>
           </p:cNvPr>
@@ -5286,7 +5384,7 @@
           <a:p>
             <a:r>
               <a:rPr lang="en-CA" dirty="0"/>
-              <a:t>Use Braces</a:t>
+              <a:t>Consider the Test Cases</a:t>
             </a:r>
           </a:p>
         </p:txBody>
@@ -5296,7 +5394,7 @@
           <p:cNvPr id="3" name="Content Placeholder 2">
             <a:extLst>
               <a:ext uri="{FF2B5EF4-FFF2-40B4-BE49-F238E27FC236}">
-                <a16:creationId xmlns:a16="http://schemas.microsoft.com/office/drawing/2014/main" id="{5E37D226-B9D0-7E53-A7C0-823472D1E0FE}"/>
+                <a16:creationId xmlns:a16="http://schemas.microsoft.com/office/drawing/2014/main" id="{F4D3E700-1C44-A6C6-C6AF-0037DCD75C68}"/>
               </a:ext>
             </a:extLst>
           </p:cNvPr>
@@ -5314,13 +5412,25 @@
           <a:p>
             <a:r>
               <a:rPr lang="en-CA" dirty="0"/>
-              <a:t>If statements and loops don’t require curly braces</a:t>
-            </a:r>
-          </a:p>
-          <a:p>
-            <a:r>
-              <a:rPr lang="en-CA" dirty="0"/>
-              <a:t>However, it can make code easier to read and avoid errors </a:t>
+              <a:t>Make them explicit</a:t>
+            </a:r>
+          </a:p>
+          <a:p>
+            <a:r>
+              <a:rPr lang="en-CA" dirty="0"/>
+              <a:t>Don’t solve every problem right away</a:t>
+            </a:r>
+          </a:p>
+          <a:p>
+            <a:r>
+              <a:rPr lang="en-CA" dirty="0"/>
+              <a:t>Sometimes code is “good enough”</a:t>
+            </a:r>
+          </a:p>
+          <a:p>
+            <a:r>
+              <a:rPr lang="en-CA" dirty="0"/>
+              <a:t>That is where documentation is important </a:t>
             </a:r>
           </a:p>
         </p:txBody>
@@ -5328,7 +5438,7 @@
     </p:spTree>
     <p:extLst>
       <p:ext uri="{BB962C8B-B14F-4D97-AF65-F5344CB8AC3E}">
-        <p14:creationId xmlns:p14="http://schemas.microsoft.com/office/powerpoint/2010/main" val="735660597"/>
+        <p14:creationId xmlns:p14="http://schemas.microsoft.com/office/powerpoint/2010/main" val="3069868560"/>
       </p:ext>
     </p:extLst>
   </p:cSld>

</xml_diff>

<commit_message>
lecture 6 notes completed
</commit_message>
<xml_diff>
--- a/class-notes/cs321-winter-2023-lecture-5-coding-tips.pptx
+++ b/class-notes/cs321-winter-2023-lecture-5-coding-tips.pptx
@@ -5,7 +5,7 @@
     <p:sldMasterId id="2147484010" r:id="rId1"/>
   </p:sldMasterIdLst>
   <p:notesMasterIdLst>
-    <p:notesMasterId r:id="rId17"/>
+    <p:notesMasterId r:id="rId16"/>
   </p:notesMasterIdLst>
   <p:sldIdLst>
     <p:sldId id="449" r:id="rId2"/>
@@ -21,25 +21,24 @@
     <p:sldId id="467" r:id="rId12"/>
     <p:sldId id="469" r:id="rId13"/>
     <p:sldId id="470" r:id="rId14"/>
-    <p:sldId id="459" r:id="rId15"/>
-    <p:sldId id="468" r:id="rId16"/>
+    <p:sldId id="468" r:id="rId15"/>
   </p:sldIdLst>
   <p:sldSz cx="18288000" cy="10287000"/>
   <p:notesSz cx="18288000" cy="10287000"/>
   <p:embeddedFontLst>
     <p:embeddedFont>
       <p:font typeface="Calibri" panose="020F0502020204030204" pitchFamily="34" charset="0"/>
-      <p:regular r:id="rId18"/>
-      <p:bold r:id="rId19"/>
-      <p:italic r:id="rId20"/>
-      <p:boldItalic r:id="rId21"/>
+      <p:regular r:id="rId17"/>
+      <p:bold r:id="rId18"/>
+      <p:italic r:id="rId19"/>
+      <p:boldItalic r:id="rId20"/>
     </p:embeddedFont>
     <p:embeddedFont>
       <p:font typeface="Corbel" panose="020B0503020204020204" pitchFamily="34" charset="0"/>
-      <p:regular r:id="rId22"/>
-      <p:bold r:id="rId23"/>
-      <p:italic r:id="rId24"/>
-      <p:boldItalic r:id="rId25"/>
+      <p:regular r:id="rId21"/>
+      <p:bold r:id="rId22"/>
+      <p:italic r:id="rId23"/>
+      <p:boldItalic r:id="rId24"/>
     </p:embeddedFont>
   </p:embeddedFontLst>
   <p:defaultTextStyle>
@@ -644,6 +643,90 @@
     </a:lvl9pPr>
   </p:notesStyle>
 </p:notesMaster>
+</file>
+
+<file path=ppt/notesSlides/notesSlide1.xml><?xml version="1.0" encoding="utf-8"?>
+<p:notes xmlns:a="http://schemas.openxmlformats.org/drawingml/2006/main" xmlns:r="http://schemas.openxmlformats.org/officeDocument/2006/relationships" xmlns:p="http://schemas.openxmlformats.org/presentationml/2006/main">
+  <p:cSld>
+    <p:spTree>
+      <p:nvGrpSpPr>
+        <p:cNvPr id="1" name=""/>
+        <p:cNvGrpSpPr/>
+        <p:nvPr/>
+      </p:nvGrpSpPr>
+      <p:grpSpPr>
+        <a:xfrm>
+          <a:off x="0" y="0"/>
+          <a:ext cx="0" cy="0"/>
+          <a:chOff x="0" y="0"/>
+          <a:chExt cx="0" cy="0"/>
+        </a:xfrm>
+      </p:grpSpPr>
+      <p:sp>
+        <p:nvSpPr>
+          <p:cNvPr id="2" name="Slide Image Placeholder 1"/>
+          <p:cNvSpPr>
+            <a:spLocks noGrp="1" noRot="1" noChangeAspect="1"/>
+          </p:cNvSpPr>
+          <p:nvPr>
+            <p:ph type="sldImg"/>
+          </p:nvPr>
+        </p:nvSpPr>
+        <p:spPr/>
+      </p:sp>
+      <p:sp>
+        <p:nvSpPr>
+          <p:cNvPr id="3" name="Notes Placeholder 2"/>
+          <p:cNvSpPr>
+            <a:spLocks noGrp="1"/>
+          </p:cNvSpPr>
+          <p:nvPr>
+            <p:ph type="body" idx="1"/>
+          </p:nvPr>
+        </p:nvSpPr>
+        <p:spPr/>
+        <p:txBody>
+          <a:bodyPr/>
+          <a:lstStyle/>
+          <a:p>
+            <a:endParaRPr lang="en-CA" dirty="0"/>
+          </a:p>
+        </p:txBody>
+      </p:sp>
+      <p:sp>
+        <p:nvSpPr>
+          <p:cNvPr id="4" name="Slide Number Placeholder 3"/>
+          <p:cNvSpPr>
+            <a:spLocks noGrp="1"/>
+          </p:cNvSpPr>
+          <p:nvPr>
+            <p:ph type="sldNum" sz="quarter" idx="5"/>
+          </p:nvPr>
+        </p:nvSpPr>
+        <p:spPr/>
+        <p:txBody>
+          <a:bodyPr/>
+          <a:lstStyle/>
+          <a:p>
+            <a:fld id="{406DC430-8259-49BD-A3AF-7901CB5ACC58}" type="slidenum">
+              <a:rPr lang="en-CA" smtClean="0"/>
+              <a:t>2</a:t>
+            </a:fld>
+            <a:endParaRPr lang="en-CA"/>
+          </a:p>
+        </p:txBody>
+      </p:sp>
+    </p:spTree>
+    <p:extLst>
+      <p:ext uri="{BB962C8B-B14F-4D97-AF65-F5344CB8AC3E}">
+        <p14:creationId xmlns:p14="http://schemas.microsoft.com/office/powerpoint/2010/main" val="3204001789"/>
+      </p:ext>
+    </p:extLst>
+  </p:cSld>
+  <p:clrMapOvr>
+    <a:masterClrMapping/>
+  </p:clrMapOvr>
+</p:notes>
 </file>
 
 <file path=ppt/slideLayouts/slideLayout1.xml><?xml version="1.0" encoding="utf-8"?>
@@ -4034,13 +4117,21 @@
           <a:lstStyle/>
           <a:p>
             <a:r>
-              <a:rPr lang="en-CA" dirty="0"/>
+              <a:rPr lang="en-CA" dirty="0">
+                <a:solidFill>
+                  <a:schemeClr val="tx1"/>
+                </a:solidFill>
+              </a:rPr>
               <a:t>If statements and loops don’t require curly braces</a:t>
             </a:r>
           </a:p>
           <a:p>
             <a:r>
-              <a:rPr lang="en-CA" dirty="0"/>
+              <a:rPr lang="en-CA" dirty="0">
+                <a:solidFill>
+                  <a:schemeClr val="tx1"/>
+                </a:solidFill>
+              </a:rPr>
               <a:t>However, it can make code easier to read and avoid errors </a:t>
             </a:r>
           </a:p>
@@ -4126,25 +4217,41 @@
           <a:lstStyle/>
           <a:p>
             <a:r>
-              <a:rPr lang="en-CA" dirty="0"/>
+              <a:rPr lang="en-CA" dirty="0">
+                <a:solidFill>
+                  <a:schemeClr val="tx1"/>
+                </a:solidFill>
+              </a:rPr>
               <a:t>While learning, break complex expressions down into smaller ones</a:t>
             </a:r>
           </a:p>
           <a:p>
             <a:r>
-              <a:rPr lang="en-CA" dirty="0"/>
+              <a:rPr lang="en-CA" dirty="0">
+                <a:solidFill>
+                  <a:schemeClr val="tx1"/>
+                </a:solidFill>
+              </a:rPr>
               <a:t>Assign sub-expressions to variables</a:t>
             </a:r>
           </a:p>
           <a:p>
             <a:r>
-              <a:rPr lang="en-CA" dirty="0"/>
+              <a:rPr lang="en-CA" dirty="0">
+                <a:solidFill>
+                  <a:schemeClr val="tx1"/>
+                </a:solidFill>
+              </a:rPr>
               <a:t>Yes your code is longer, but easier to find mistakes </a:t>
             </a:r>
           </a:p>
           <a:p>
             <a:r>
-              <a:rPr lang="en-CA" dirty="0"/>
+              <a:rPr lang="en-CA" dirty="0">
+                <a:solidFill>
+                  <a:schemeClr val="tx1"/>
+                </a:solidFill>
+              </a:rPr>
               <a:t>You can also debug easier</a:t>
             </a:r>
           </a:p>
@@ -4230,31 +4337,51 @@
           <a:lstStyle/>
           <a:p>
             <a:r>
-              <a:rPr lang="en-CA" dirty="0"/>
+              <a:rPr lang="en-CA" dirty="0">
+                <a:solidFill>
+                  <a:schemeClr val="tx1"/>
+                </a:solidFill>
+              </a:rPr>
               <a:t>Don’t put too many</a:t>
             </a:r>
           </a:p>
           <a:p>
             <a:r>
-              <a:rPr lang="en-CA" dirty="0"/>
+              <a:rPr lang="en-CA" dirty="0">
+                <a:solidFill>
+                  <a:schemeClr val="tx1"/>
+                </a:solidFill>
+              </a:rPr>
               <a:t>Don’t state the obvious </a:t>
             </a:r>
           </a:p>
           <a:p>
             <a:r>
-              <a:rPr lang="en-CA" dirty="0"/>
+              <a:rPr lang="en-CA" dirty="0">
+                <a:solidFill>
+                  <a:schemeClr val="tx1"/>
+                </a:solidFill>
+              </a:rPr>
               <a:t>They are for you and the reader</a:t>
             </a:r>
           </a:p>
           <a:p>
             <a:r>
-              <a:rPr lang="en-CA" dirty="0"/>
+              <a:rPr lang="en-CA" dirty="0">
+                <a:solidFill>
+                  <a:schemeClr val="tx1"/>
+                </a:solidFill>
+              </a:rPr>
               <a:t>Tell us something useful </a:t>
             </a:r>
           </a:p>
           <a:p>
             <a:r>
-              <a:rPr lang="en-CA" dirty="0"/>
+              <a:rPr lang="en-CA" dirty="0">
+                <a:solidFill>
+                  <a:schemeClr val="tx1"/>
+                </a:solidFill>
+              </a:rPr>
               <a:t>Code should speak for itself</a:t>
             </a:r>
           </a:p>
@@ -4360,92 +4487,6 @@
 </file>
 
 <file path=ppt/slides/slide14.xml><?xml version="1.0" encoding="utf-8"?>
-<p:sld xmlns:a="http://schemas.openxmlformats.org/drawingml/2006/main" xmlns:r="http://schemas.openxmlformats.org/officeDocument/2006/relationships" xmlns:p="http://schemas.openxmlformats.org/presentationml/2006/main">
-  <p:cSld>
-    <p:spTree>
-      <p:nvGrpSpPr>
-        <p:cNvPr id="1" name=""/>
-        <p:cNvGrpSpPr/>
-        <p:nvPr/>
-      </p:nvGrpSpPr>
-      <p:grpSpPr>
-        <a:xfrm>
-          <a:off x="0" y="0"/>
-          <a:ext cx="0" cy="0"/>
-          <a:chOff x="0" y="0"/>
-          <a:chExt cx="0" cy="0"/>
-        </a:xfrm>
-      </p:grpSpPr>
-      <p:sp>
-        <p:nvSpPr>
-          <p:cNvPr id="2" name="Title 1">
-            <a:extLst>
-              <a:ext uri="{FF2B5EF4-FFF2-40B4-BE49-F238E27FC236}">
-                <a16:creationId xmlns:a16="http://schemas.microsoft.com/office/drawing/2014/main" id="{3563E7A6-B910-0243-9391-C8686F3839FA}"/>
-              </a:ext>
-            </a:extLst>
-          </p:cNvPr>
-          <p:cNvSpPr>
-            <a:spLocks noGrp="1"/>
-          </p:cNvSpPr>
-          <p:nvPr>
-            <p:ph type="title"/>
-          </p:nvPr>
-        </p:nvSpPr>
-        <p:spPr/>
-        <p:txBody>
-          <a:bodyPr/>
-          <a:lstStyle/>
-          <a:p>
-            <a:r>
-              <a:rPr lang="en-CA" dirty="0"/>
-              <a:t>For Note:</a:t>
-            </a:r>
-          </a:p>
-        </p:txBody>
-      </p:sp>
-      <p:sp>
-        <p:nvSpPr>
-          <p:cNvPr id="3" name="Content Placeholder 2">
-            <a:extLst>
-              <a:ext uri="{FF2B5EF4-FFF2-40B4-BE49-F238E27FC236}">
-                <a16:creationId xmlns:a16="http://schemas.microsoft.com/office/drawing/2014/main" id="{E86A9D30-4FB0-E93E-86B9-4BDC1813F907}"/>
-              </a:ext>
-            </a:extLst>
-          </p:cNvPr>
-          <p:cNvSpPr>
-            <a:spLocks noGrp="1"/>
-          </p:cNvSpPr>
-          <p:nvPr>
-            <p:ph idx="1"/>
-          </p:nvPr>
-        </p:nvSpPr>
-        <p:spPr/>
-        <p:txBody>
-          <a:bodyPr/>
-          <a:lstStyle/>
-          <a:p>
-            <a:r>
-              <a:rPr lang="en-CA" dirty="0"/>
-              <a:t>Don’t monkey with the loop index</a:t>
-            </a:r>
-          </a:p>
-        </p:txBody>
-      </p:sp>
-    </p:spTree>
-    <p:extLst>
-      <p:ext uri="{BB962C8B-B14F-4D97-AF65-F5344CB8AC3E}">
-        <p14:creationId xmlns:p14="http://schemas.microsoft.com/office/powerpoint/2010/main" val="413442007"/>
-      </p:ext>
-    </p:extLst>
-  </p:cSld>
-  <p:clrMapOvr>
-    <a:masterClrMapping/>
-  </p:clrMapOvr>
-</p:sld>
-</file>
-
-<file path=ppt/slides/slide15.xml><?xml version="1.0" encoding="utf-8"?>
 <p:sld xmlns:a="http://schemas.openxmlformats.org/drawingml/2006/main" xmlns:r="http://schemas.openxmlformats.org/officeDocument/2006/relationships" xmlns:p="http://schemas.openxmlformats.org/presentationml/2006/main">
   <p:cSld>
     <p:spTree>
@@ -4643,7 +4684,7 @@
           </p:nvPr>
         </p:nvPicPr>
         <p:blipFill>
-          <a:blip r:embed="rId2"/>
+          <a:blip r:embed="rId3"/>
           <a:stretch>
             <a:fillRect/>
           </a:stretch>
@@ -4738,19 +4779,31 @@
           <a:lstStyle/>
           <a:p>
             <a:r>
-              <a:rPr lang="en-CA" dirty="0"/>
+              <a:rPr lang="en-CA" dirty="0">
+                <a:solidFill>
+                  <a:schemeClr val="tx1"/>
+                </a:solidFill>
+              </a:rPr>
               <a:t>Practice, practice, practice </a:t>
             </a:r>
           </a:p>
           <a:p>
             <a:r>
-              <a:rPr lang="en-CA" dirty="0"/>
+              <a:rPr lang="en-CA" dirty="0">
+                <a:solidFill>
+                  <a:schemeClr val="tx1"/>
+                </a:solidFill>
+              </a:rPr>
               <a:t>You will get much faster</a:t>
             </a:r>
           </a:p>
           <a:p>
             <a:r>
-              <a:rPr lang="en-CA" dirty="0"/>
+              <a:rPr lang="en-CA" dirty="0">
+                <a:solidFill>
+                  <a:schemeClr val="tx1"/>
+                </a:solidFill>
+              </a:rPr>
               <a:t>If you are stuck, ask for help </a:t>
             </a:r>
           </a:p>
@@ -4836,25 +4889,41 @@
           <a:lstStyle/>
           <a:p>
             <a:r>
-              <a:rPr lang="en-CA" dirty="0"/>
+              <a:rPr lang="en-CA" dirty="0">
+                <a:solidFill>
+                  <a:schemeClr val="tx1"/>
+                </a:solidFill>
+              </a:rPr>
               <a:t>Recognizing mistakes</a:t>
             </a:r>
           </a:p>
           <a:p>
             <a:r>
-              <a:rPr lang="en-CA" dirty="0"/>
+              <a:rPr lang="en-CA" dirty="0">
+                <a:solidFill>
+                  <a:schemeClr val="tx1"/>
+                </a:solidFill>
+              </a:rPr>
               <a:t>Reading code</a:t>
             </a:r>
           </a:p>
           <a:p>
             <a:r>
-              <a:rPr lang="en-CA" dirty="0"/>
+              <a:rPr lang="en-CA" dirty="0">
+                <a:solidFill>
+                  <a:schemeClr val="tx1"/>
+                </a:solidFill>
+              </a:rPr>
               <a:t>Problem solving </a:t>
             </a:r>
           </a:p>
           <a:p>
             <a:r>
-              <a:rPr lang="en-CA" dirty="0"/>
+              <a:rPr lang="en-CA" dirty="0">
+                <a:solidFill>
+                  <a:schemeClr val="tx1"/>
+                </a:solidFill>
+              </a:rPr>
               <a:t>Writing code </a:t>
             </a:r>
           </a:p>
@@ -4943,31 +5012,51 @@
           <a:lstStyle/>
           <a:p>
             <a:r>
-              <a:rPr lang="en-CA" dirty="0"/>
+              <a:rPr lang="en-CA" dirty="0">
+                <a:solidFill>
+                  <a:schemeClr val="tx1"/>
+                </a:solidFill>
+              </a:rPr>
               <a:t>If you are confused </a:t>
             </a:r>
           </a:p>
           <a:p>
             <a:r>
-              <a:rPr lang="en-CA" dirty="0"/>
+              <a:rPr lang="en-CA" dirty="0">
+                <a:solidFill>
+                  <a:schemeClr val="tx1"/>
+                </a:solidFill>
+              </a:rPr>
               <a:t>Set a breakpoint see what it does</a:t>
             </a:r>
           </a:p>
           <a:p>
             <a:r>
-              <a:rPr lang="en-CA" dirty="0"/>
+              <a:rPr lang="en-CA" dirty="0">
+                <a:solidFill>
+                  <a:schemeClr val="tx1"/>
+                </a:solidFill>
+              </a:rPr>
               <a:t>Step through the code</a:t>
             </a:r>
           </a:p>
           <a:p>
             <a:r>
-              <a:rPr lang="en-CA" dirty="0"/>
+              <a:rPr lang="en-CA" dirty="0">
+                <a:solidFill>
+                  <a:schemeClr val="tx1"/>
+                </a:solidFill>
+              </a:rPr>
               <a:t>Ask yourself, is it doing what I expected? </a:t>
             </a:r>
           </a:p>
           <a:p>
             <a:r>
-              <a:rPr lang="en-CA" dirty="0"/>
+              <a:rPr lang="en-CA" dirty="0">
+                <a:solidFill>
+                  <a:schemeClr val="tx1"/>
+                </a:solidFill>
+              </a:rPr>
               <a:t>Why or why not? </a:t>
             </a:r>
           </a:p>
@@ -5175,65 +5264,121 @@
           <a:lstStyle/>
           <a:p>
             <a:r>
-              <a:rPr lang="en-CA" dirty="0"/>
+              <a:rPr lang="en-CA" dirty="0">
+                <a:solidFill>
+                  <a:schemeClr val="tx1"/>
+                </a:solidFill>
+              </a:rPr>
               <a:t>Use </a:t>
             </a:r>
             <a:r>
-              <a:rPr lang="en-CA" dirty="0" err="1"/>
+              <a:rPr lang="en-CA" dirty="0" err="1">
+                <a:solidFill>
+                  <a:schemeClr val="tx1"/>
+                </a:solidFill>
+              </a:rPr>
               <a:t>Debug.WriteLine</a:t>
             </a:r>
             <a:r>
-              <a:rPr lang="en-CA" dirty="0"/>
+              <a:rPr lang="en-CA" dirty="0">
+                <a:solidFill>
+                  <a:schemeClr val="tx1"/>
+                </a:solidFill>
+              </a:rPr>
               <a:t>() in regular code </a:t>
             </a:r>
           </a:p>
           <a:p>
             <a:r>
-              <a:rPr lang="en-CA" dirty="0"/>
+              <a:rPr lang="en-CA" dirty="0">
+                <a:solidFill>
+                  <a:schemeClr val="tx1"/>
+                </a:solidFill>
+              </a:rPr>
               <a:t>Use </a:t>
             </a:r>
             <a:r>
-              <a:rPr lang="en-CA" dirty="0" err="1"/>
+              <a:rPr lang="en-CA" dirty="0" err="1">
+                <a:solidFill>
+                  <a:schemeClr val="tx1"/>
+                </a:solidFill>
+              </a:rPr>
               <a:t>Console.WriteLine</a:t>
             </a:r>
             <a:r>
-              <a:rPr lang="en-CA" dirty="0"/>
+              <a:rPr lang="en-CA" dirty="0">
+                <a:solidFill>
+                  <a:schemeClr val="tx1"/>
+                </a:solidFill>
+              </a:rPr>
               <a:t>() in tests </a:t>
             </a:r>
           </a:p>
           <a:p>
             <a:r>
-              <a:rPr lang="en-CA" dirty="0"/>
+              <a:rPr lang="en-CA" dirty="0">
+                <a:solidFill>
+                  <a:schemeClr val="tx1"/>
+                </a:solidFill>
+              </a:rPr>
               <a:t>Use </a:t>
             </a:r>
             <a:r>
-              <a:rPr lang="en-CA" dirty="0" err="1"/>
+              <a:rPr lang="en-CA" dirty="0" err="1">
+                <a:solidFill>
+                  <a:schemeClr val="tx1"/>
+                </a:solidFill>
+              </a:rPr>
               <a:t>Debug.Assert</a:t>
             </a:r>
             <a:r>
-              <a:rPr lang="en-CA" dirty="0"/>
+              <a:rPr lang="en-CA" dirty="0">
+                <a:solidFill>
+                  <a:schemeClr val="tx1"/>
+                </a:solidFill>
+              </a:rPr>
               <a:t>() in regular code</a:t>
             </a:r>
           </a:p>
           <a:p>
             <a:r>
-              <a:rPr lang="en-CA" dirty="0"/>
+              <a:rPr lang="en-CA" dirty="0">
+                <a:solidFill>
+                  <a:schemeClr val="tx1"/>
+                </a:solidFill>
+              </a:rPr>
               <a:t>Use </a:t>
             </a:r>
             <a:r>
-              <a:rPr lang="en-CA" dirty="0" err="1"/>
+              <a:rPr lang="en-CA" dirty="0" err="1">
+                <a:solidFill>
+                  <a:schemeClr val="tx1"/>
+                </a:solidFill>
+              </a:rPr>
               <a:t>Assert.IsTrue</a:t>
             </a:r>
             <a:r>
-              <a:rPr lang="en-CA" dirty="0"/>
+              <a:rPr lang="en-CA" dirty="0">
+                <a:solidFill>
+                  <a:schemeClr val="tx1"/>
+                </a:solidFill>
+              </a:rPr>
               <a:t> or </a:t>
             </a:r>
             <a:r>
-              <a:rPr lang="en-CA" dirty="0" err="1"/>
+              <a:rPr lang="en-CA" dirty="0" err="1">
+                <a:solidFill>
+                  <a:schemeClr val="tx1"/>
+                </a:solidFill>
+              </a:rPr>
               <a:t>Assert.AreEqual</a:t>
             </a:r>
             <a:r>
-              <a:rPr lang="en-CA" dirty="0"/>
+              <a:rPr lang="en-CA" dirty="0">
+                <a:solidFill>
+                  <a:schemeClr val="tx1"/>
+                </a:solidFill>
+              </a:rPr>
               <a:t> in tests projects </a:t>
             </a:r>
           </a:p>
@@ -5319,13 +5464,21 @@
           <a:lstStyle/>
           <a:p>
             <a:r>
-              <a:rPr lang="en-CA" dirty="0"/>
+              <a:rPr lang="en-CA" dirty="0">
+                <a:solidFill>
+                  <a:schemeClr val="tx1"/>
+                </a:solidFill>
+              </a:rPr>
               <a:t>A problem solving trick is to reverse the direction that we loop over stuff</a:t>
             </a:r>
           </a:p>
           <a:p>
             <a:r>
-              <a:rPr lang="en-CA" dirty="0"/>
+              <a:rPr lang="en-CA" dirty="0">
+                <a:solidFill>
+                  <a:schemeClr val="tx1"/>
+                </a:solidFill>
+              </a:rPr>
               <a:t>Look for a “counter example” as opposed to proving something is true</a:t>
             </a:r>
           </a:p>
@@ -5411,25 +5564,41 @@
           <a:lstStyle/>
           <a:p>
             <a:r>
-              <a:rPr lang="en-CA" dirty="0"/>
+              <a:rPr lang="en-CA" dirty="0">
+                <a:solidFill>
+                  <a:schemeClr val="tx1"/>
+                </a:solidFill>
+              </a:rPr>
               <a:t>Make them explicit</a:t>
             </a:r>
           </a:p>
           <a:p>
             <a:r>
-              <a:rPr lang="en-CA" dirty="0"/>
+              <a:rPr lang="en-CA" dirty="0">
+                <a:solidFill>
+                  <a:schemeClr val="tx1"/>
+                </a:solidFill>
+              </a:rPr>
               <a:t>Don’t solve every problem right away</a:t>
             </a:r>
           </a:p>
           <a:p>
             <a:r>
-              <a:rPr lang="en-CA" dirty="0"/>
+              <a:rPr lang="en-CA" dirty="0">
+                <a:solidFill>
+                  <a:schemeClr val="tx1"/>
+                </a:solidFill>
+              </a:rPr>
               <a:t>Sometimes code is “good enough”</a:t>
             </a:r>
           </a:p>
           <a:p>
             <a:r>
-              <a:rPr lang="en-CA" dirty="0"/>
+              <a:rPr lang="en-CA" dirty="0">
+                <a:solidFill>
+                  <a:schemeClr val="tx1"/>
+                </a:solidFill>
+              </a:rPr>
               <a:t>That is where documentation is important </a:t>
             </a:r>
           </a:p>

</xml_diff>